<commit_message>
React slides + updates
</commit_message>
<xml_diff>
--- a/React/React Session 1.pptx
+++ b/React/React Session 1.pptx
@@ -8863,7 +8863,19 @@
         <a:p>
           <a:r>
             <a:rPr lang="en-GB" b="0" dirty="0"/>
-            <a:t>Dependency array, if left empty then</a:t>
+            <a:t>Dependency array, if left as empty array, </a:t>
+          </a:r>
+          <a:r>
+            <a:rPr lang="en-GB" b="0" dirty="0" err="1"/>
+            <a:t>useEffect</a:t>
+          </a:r>
+          <a:r>
+            <a:rPr lang="en-GB" b="0" dirty="0"/>
+            <a:t> is only called </a:t>
+          </a:r>
+          <a:r>
+            <a:rPr lang="en-GB" b="0"/>
+            <a:t>at the start</a:t>
           </a:r>
           <a:endParaRPr lang="fr-FR" b="0" dirty="0"/>
         </a:p>
@@ -12693,8 +12705,8 @@
       </dsp:nvSpPr>
       <dsp:spPr>
         <a:xfrm>
-          <a:off x="0" y="12552"/>
-          <a:ext cx="10058399" cy="791505"/>
+          <a:off x="0" y="497112"/>
+          <a:ext cx="10058399" cy="599625"/>
         </a:xfrm>
         <a:prstGeom prst="roundRect">
           <a:avLst/>
@@ -12735,12 +12747,12 @@
         </a:fontRef>
       </dsp:style>
       <dsp:txBody>
-        <a:bodyPr spcFirstLastPara="0" vert="horz" wrap="square" lIns="125730" tIns="125730" rIns="125730" bIns="125730" numCol="1" spcCol="1270" anchor="ctr" anchorCtr="0">
+        <a:bodyPr spcFirstLastPara="0" vert="horz" wrap="square" lIns="95250" tIns="95250" rIns="95250" bIns="95250" numCol="1" spcCol="1270" anchor="ctr" anchorCtr="0">
           <a:noAutofit/>
         </a:bodyPr>
         <a:lstStyle/>
         <a:p>
-          <a:pPr marL="0" lvl="0" indent="0" algn="l" defTabSz="1466850">
+          <a:pPr marL="0" lvl="0" indent="0" algn="l" defTabSz="1111250">
             <a:lnSpc>
               <a:spcPct val="90000"/>
             </a:lnSpc>
@@ -12753,15 +12765,15 @@
             <a:buNone/>
           </a:pPr>
           <a:r>
-            <a:rPr lang="en-GB" sz="3300" b="0" kern="1200" dirty="0"/>
+            <a:rPr lang="en-GB" sz="2500" b="0" kern="1200" dirty="0"/>
             <a:t>Allows us to do something when an event happens</a:t>
           </a:r>
-          <a:endParaRPr lang="fr-FR" sz="3300" b="0" kern="1200" dirty="0"/>
+          <a:endParaRPr lang="fr-FR" sz="2500" b="0" kern="1200" dirty="0"/>
         </a:p>
       </dsp:txBody>
       <dsp:txXfrm>
-        <a:off x="38638" y="51190"/>
-        <a:ext cx="9981123" cy="714229"/>
+        <a:off x="29271" y="526383"/>
+        <a:ext cx="9999857" cy="541083"/>
       </dsp:txXfrm>
     </dsp:sp>
     <dsp:sp modelId="{BF00494C-7DE8-4B85-852A-7DFDC9DE1D67}">
@@ -12771,8 +12783,8 @@
       </dsp:nvSpPr>
       <dsp:spPr>
         <a:xfrm>
-          <a:off x="0" y="899097"/>
-          <a:ext cx="10058399" cy="791505"/>
+          <a:off x="0" y="1168737"/>
+          <a:ext cx="10058399" cy="599625"/>
         </a:xfrm>
         <a:prstGeom prst="roundRect">
           <a:avLst/>
@@ -12813,12 +12825,12 @@
         </a:fontRef>
       </dsp:style>
       <dsp:txBody>
-        <a:bodyPr spcFirstLastPara="0" vert="horz" wrap="square" lIns="125730" tIns="125730" rIns="125730" bIns="125730" numCol="1" spcCol="1270" anchor="ctr" anchorCtr="0">
+        <a:bodyPr spcFirstLastPara="0" vert="horz" wrap="square" lIns="95250" tIns="95250" rIns="95250" bIns="95250" numCol="1" spcCol="1270" anchor="ctr" anchorCtr="0">
           <a:noAutofit/>
         </a:bodyPr>
         <a:lstStyle/>
         <a:p>
-          <a:pPr marL="0" lvl="0" indent="0" algn="l" defTabSz="1466850">
+          <a:pPr marL="0" lvl="0" indent="0" algn="l" defTabSz="1111250">
             <a:lnSpc>
               <a:spcPct val="90000"/>
             </a:lnSpc>
@@ -12831,23 +12843,23 @@
             <a:buNone/>
           </a:pPr>
           <a:r>
-            <a:rPr lang="en-GB" sz="3300" b="0" kern="1200" dirty="0"/>
+            <a:rPr lang="en-GB" sz="2500" b="0" kern="1200" dirty="0"/>
             <a:t>Import {</a:t>
           </a:r>
           <a:r>
-            <a:rPr lang="en-GB" sz="3300" b="0" kern="1200" dirty="0" err="1"/>
+            <a:rPr lang="en-GB" sz="2500" b="0" kern="1200" dirty="0" err="1"/>
             <a:t>useEffect</a:t>
           </a:r>
           <a:r>
-            <a:rPr lang="en-GB" sz="3300" b="0" kern="1200" dirty="0"/>
+            <a:rPr lang="en-GB" sz="2500" b="0" kern="1200" dirty="0"/>
             <a:t>} from ‘react’;</a:t>
           </a:r>
-          <a:endParaRPr lang="fr-FR" sz="3300" b="0" kern="1200" dirty="0"/>
+          <a:endParaRPr lang="fr-FR" sz="2500" b="0" kern="1200" dirty="0"/>
         </a:p>
       </dsp:txBody>
       <dsp:txXfrm>
-        <a:off x="38638" y="937735"/>
-        <a:ext cx="9981123" cy="714229"/>
+        <a:off x="29271" y="1198008"/>
+        <a:ext cx="9999857" cy="541083"/>
       </dsp:txXfrm>
     </dsp:sp>
     <dsp:sp modelId="{2A74DB47-7465-4985-8977-DD6AA5A3423F}">
@@ -12857,8 +12869,8 @@
       </dsp:nvSpPr>
       <dsp:spPr>
         <a:xfrm>
-          <a:off x="0" y="1785642"/>
-          <a:ext cx="10058399" cy="791505"/>
+          <a:off x="0" y="1840362"/>
+          <a:ext cx="10058399" cy="599625"/>
         </a:xfrm>
         <a:prstGeom prst="roundRect">
           <a:avLst/>
@@ -12899,12 +12911,12 @@
         </a:fontRef>
       </dsp:style>
       <dsp:txBody>
-        <a:bodyPr spcFirstLastPara="0" vert="horz" wrap="square" lIns="125730" tIns="125730" rIns="125730" bIns="125730" numCol="1" spcCol="1270" anchor="ctr" anchorCtr="0">
+        <a:bodyPr spcFirstLastPara="0" vert="horz" wrap="square" lIns="95250" tIns="95250" rIns="95250" bIns="95250" numCol="1" spcCol="1270" anchor="ctr" anchorCtr="0">
           <a:noAutofit/>
         </a:bodyPr>
         <a:lstStyle/>
         <a:p>
-          <a:pPr marL="0" lvl="0" indent="0" algn="l" defTabSz="1466850">
+          <a:pPr marL="0" lvl="0" indent="0" algn="l" defTabSz="1111250">
             <a:lnSpc>
               <a:spcPct val="90000"/>
             </a:lnSpc>
@@ -12917,23 +12929,23 @@
             <a:buNone/>
           </a:pPr>
           <a:r>
-            <a:rPr lang="en-GB" sz="3300" b="0" kern="1200" dirty="0"/>
+            <a:rPr lang="en-GB" sz="2500" b="0" kern="1200" dirty="0"/>
             <a:t>Syntax: </a:t>
           </a:r>
           <a:r>
-            <a:rPr lang="en-GB" sz="3300" b="0" kern="1200" dirty="0" err="1"/>
+            <a:rPr lang="en-GB" sz="2500" b="0" kern="1200" dirty="0" err="1"/>
             <a:t>useEffect</a:t>
           </a:r>
           <a:r>
-            <a:rPr lang="en-GB" sz="3300" b="0" kern="1200" dirty="0"/>
+            <a:rPr lang="en-GB" sz="2500" b="0" kern="1200" dirty="0"/>
             <a:t>(()=&gt;{console.log(‘page loaded’)})</a:t>
           </a:r>
-          <a:endParaRPr lang="fr-FR" sz="3300" b="0" kern="1200" dirty="0"/>
+          <a:endParaRPr lang="fr-FR" sz="2500" b="0" kern="1200" dirty="0"/>
         </a:p>
       </dsp:txBody>
       <dsp:txXfrm>
-        <a:off x="38638" y="1824280"/>
-        <a:ext cx="9981123" cy="714229"/>
+        <a:off x="29271" y="1869633"/>
+        <a:ext cx="9999857" cy="541083"/>
       </dsp:txXfrm>
     </dsp:sp>
     <dsp:sp modelId="{4E39B73D-095C-4C9D-AED2-9922AAD4FECF}">
@@ -12943,8 +12955,8 @@
       </dsp:nvSpPr>
       <dsp:spPr>
         <a:xfrm>
-          <a:off x="0" y="2672187"/>
-          <a:ext cx="10058399" cy="791505"/>
+          <a:off x="0" y="2511987"/>
+          <a:ext cx="10058399" cy="599625"/>
         </a:xfrm>
         <a:prstGeom prst="roundRect">
           <a:avLst/>
@@ -12985,12 +12997,12 @@
         </a:fontRef>
       </dsp:style>
       <dsp:txBody>
-        <a:bodyPr spcFirstLastPara="0" vert="horz" wrap="square" lIns="125730" tIns="125730" rIns="125730" bIns="125730" numCol="1" spcCol="1270" anchor="ctr" anchorCtr="0">
+        <a:bodyPr spcFirstLastPara="0" vert="horz" wrap="square" lIns="95250" tIns="95250" rIns="95250" bIns="95250" numCol="1" spcCol="1270" anchor="ctr" anchorCtr="0">
           <a:noAutofit/>
         </a:bodyPr>
         <a:lstStyle/>
         <a:p>
-          <a:pPr marL="0" lvl="0" indent="0" algn="l" defTabSz="1466850">
+          <a:pPr marL="0" lvl="0" indent="0" algn="l" defTabSz="1111250">
             <a:lnSpc>
               <a:spcPct val="90000"/>
             </a:lnSpc>
@@ -13003,15 +13015,27 @@
             <a:buNone/>
           </a:pPr>
           <a:r>
-            <a:rPr lang="en-GB" sz="3300" b="0" kern="1200" dirty="0"/>
-            <a:t>Dependency array, if left empty then</a:t>
-          </a:r>
-          <a:endParaRPr lang="fr-FR" sz="3300" b="0" kern="1200" dirty="0"/>
+            <a:rPr lang="en-GB" sz="2500" b="0" kern="1200" dirty="0"/>
+            <a:t>Dependency array, if left as empty array, </a:t>
+          </a:r>
+          <a:r>
+            <a:rPr lang="en-GB" sz="2500" b="0" kern="1200" dirty="0" err="1"/>
+            <a:t>useEffect</a:t>
+          </a:r>
+          <a:r>
+            <a:rPr lang="en-GB" sz="2500" b="0" kern="1200" dirty="0"/>
+            <a:t> is only called </a:t>
+          </a:r>
+          <a:r>
+            <a:rPr lang="en-GB" sz="2500" b="0" kern="1200"/>
+            <a:t>at the start</a:t>
+          </a:r>
+          <a:endParaRPr lang="fr-FR" sz="2500" b="0" kern="1200" dirty="0"/>
         </a:p>
       </dsp:txBody>
       <dsp:txXfrm>
-        <a:off x="38638" y="2710825"/>
-        <a:ext cx="9981123" cy="714229"/>
+        <a:off x="29271" y="2541258"/>
+        <a:ext cx="9999857" cy="541083"/>
       </dsp:txXfrm>
     </dsp:sp>
     <dsp:sp modelId="{8711B570-A1CC-4A0A-B4D8-7FF7B71C42EB}">
@@ -13021,8 +13045,8 @@
       </dsp:nvSpPr>
       <dsp:spPr>
         <a:xfrm>
-          <a:off x="0" y="3463692"/>
-          <a:ext cx="10058399" cy="546480"/>
+          <a:off x="0" y="3111612"/>
+          <a:ext cx="10058399" cy="414000"/>
         </a:xfrm>
         <a:prstGeom prst="rect">
           <a:avLst/>
@@ -13046,12 +13070,12 @@
         <a:fontRef idx="minor"/>
       </dsp:style>
       <dsp:txBody>
-        <a:bodyPr spcFirstLastPara="0" vert="horz" wrap="square" lIns="319354" tIns="41910" rIns="234696" bIns="41910" numCol="1" spcCol="1270" anchor="t" anchorCtr="0">
+        <a:bodyPr spcFirstLastPara="0" vert="horz" wrap="square" lIns="319354" tIns="31750" rIns="177800" bIns="31750" numCol="1" spcCol="1270" anchor="t" anchorCtr="0">
           <a:noAutofit/>
         </a:bodyPr>
         <a:lstStyle/>
         <a:p>
-          <a:pPr marL="228600" lvl="1" indent="-228600" algn="l" defTabSz="1155700">
+          <a:pPr marL="228600" lvl="1" indent="-228600" algn="l" defTabSz="889000">
             <a:lnSpc>
               <a:spcPct val="90000"/>
             </a:lnSpc>
@@ -13064,19 +13088,19 @@
             <a:buChar char="•"/>
           </a:pPr>
           <a:r>
-            <a:rPr lang="en-GB" sz="2600" b="0" kern="1200" dirty="0" err="1"/>
+            <a:rPr lang="en-GB" sz="2000" b="0" kern="1200" dirty="0" err="1"/>
             <a:t>useEffect</a:t>
           </a:r>
           <a:r>
-            <a:rPr lang="en-GB" sz="2600" b="0" kern="1200" dirty="0"/>
+            <a:rPr lang="en-GB" sz="2000" b="0" kern="1200" dirty="0"/>
             <a:t>(()=&gt;{console.log(‘page loaded’)}, []) </a:t>
           </a:r>
-          <a:endParaRPr lang="fr-FR" sz="2600" b="0" kern="1200" dirty="0"/>
+          <a:endParaRPr lang="fr-FR" sz="2000" b="0" kern="1200" dirty="0"/>
         </a:p>
       </dsp:txBody>
       <dsp:txXfrm>
-        <a:off x="0" y="3463692"/>
-        <a:ext cx="10058399" cy="546480"/>
+        <a:off x="0" y="3111612"/>
+        <a:ext cx="10058399" cy="414000"/>
       </dsp:txXfrm>
     </dsp:sp>
   </dsp:spTree>
@@ -34524,7 +34548,7 @@
             <p:ph idx="1"/>
             <p:extLst>
               <p:ext uri="{D42A27DB-BD31-4B8C-83A1-F6EECF244321}">
-                <p14:modId xmlns:p14="http://schemas.microsoft.com/office/powerpoint/2010/main" val="771310068"/>
+                <p14:modId xmlns:p14="http://schemas.microsoft.com/office/powerpoint/2010/main" val="782294910"/>
               </p:ext>
             </p:extLst>
           </p:nvPr>

</xml_diff>